<commit_message>
adding changes to prepare for R 0.4.0
</commit_message>
<xml_diff>
--- a/docs/IntroSlide.pptx
+++ b/docs/IntroSlide.pptx
@@ -199,7 +199,7 @@
           <a:p>
             <a:fld id="{BE0FBC6B-ECDA-E84C-A9B5-11EC478FBE33}" type="datetimeFigureOut">
               <a:rPr lang="en-US" smtClean="0"/>
-              <a:t>1/24/23</a:t>
+              <a:t>8/23/24</a:t>
             </a:fld>
             <a:endParaRPr lang="en-US"/>
           </a:p>
@@ -681,7 +681,7 @@
           <a:p>
             <a:fld id="{E0434288-5E32-9949-BFBC-7031B3C73DE4}" type="datetimeFigureOut">
               <a:rPr lang="en-US" smtClean="0"/>
-              <a:t>1/24/23</a:t>
+              <a:t>8/23/24</a:t>
             </a:fld>
             <a:endParaRPr lang="en-US"/>
           </a:p>
@@ -851,7 +851,7 @@
           <a:p>
             <a:fld id="{E0434288-5E32-9949-BFBC-7031B3C73DE4}" type="datetimeFigureOut">
               <a:rPr lang="en-US" smtClean="0"/>
-              <a:t>1/24/23</a:t>
+              <a:t>8/23/24</a:t>
             </a:fld>
             <a:endParaRPr lang="en-US"/>
           </a:p>
@@ -1031,7 +1031,7 @@
           <a:p>
             <a:fld id="{E0434288-5E32-9949-BFBC-7031B3C73DE4}" type="datetimeFigureOut">
               <a:rPr lang="en-US" smtClean="0"/>
-              <a:t>1/24/23</a:t>
+              <a:t>8/23/24</a:t>
             </a:fld>
             <a:endParaRPr lang="en-US"/>
           </a:p>
@@ -1201,7 +1201,7 @@
           <a:p>
             <a:fld id="{E0434288-5E32-9949-BFBC-7031B3C73DE4}" type="datetimeFigureOut">
               <a:rPr lang="en-US" smtClean="0"/>
-              <a:t>1/24/23</a:t>
+              <a:t>8/23/24</a:t>
             </a:fld>
             <a:endParaRPr lang="en-US"/>
           </a:p>
@@ -1445,7 +1445,7 @@
           <a:p>
             <a:fld id="{E0434288-5E32-9949-BFBC-7031B3C73DE4}" type="datetimeFigureOut">
               <a:rPr lang="en-US" smtClean="0"/>
-              <a:t>1/24/23</a:t>
+              <a:t>8/23/24</a:t>
             </a:fld>
             <a:endParaRPr lang="en-US"/>
           </a:p>
@@ -1677,7 +1677,7 @@
           <a:p>
             <a:fld id="{E0434288-5E32-9949-BFBC-7031B3C73DE4}" type="datetimeFigureOut">
               <a:rPr lang="en-US" smtClean="0"/>
-              <a:t>1/24/23</a:t>
+              <a:t>8/23/24</a:t>
             </a:fld>
             <a:endParaRPr lang="en-US"/>
           </a:p>
@@ -2044,7 +2044,7 @@
           <a:p>
             <a:fld id="{E0434288-5E32-9949-BFBC-7031B3C73DE4}" type="datetimeFigureOut">
               <a:rPr lang="en-US" smtClean="0"/>
-              <a:t>1/24/23</a:t>
+              <a:t>8/23/24</a:t>
             </a:fld>
             <a:endParaRPr lang="en-US"/>
           </a:p>
@@ -2162,7 +2162,7 @@
           <a:p>
             <a:fld id="{E0434288-5E32-9949-BFBC-7031B3C73DE4}" type="datetimeFigureOut">
               <a:rPr lang="en-US" smtClean="0"/>
-              <a:t>1/24/23</a:t>
+              <a:t>8/23/24</a:t>
             </a:fld>
             <a:endParaRPr lang="en-US"/>
           </a:p>
@@ -2257,7 +2257,7 @@
           <a:p>
             <a:fld id="{E0434288-5E32-9949-BFBC-7031B3C73DE4}" type="datetimeFigureOut">
               <a:rPr lang="en-US" smtClean="0"/>
-              <a:t>1/24/23</a:t>
+              <a:t>8/23/24</a:t>
             </a:fld>
             <a:endParaRPr lang="en-US"/>
           </a:p>
@@ -2534,7 +2534,7 @@
           <a:p>
             <a:fld id="{E0434288-5E32-9949-BFBC-7031B3C73DE4}" type="datetimeFigureOut">
               <a:rPr lang="en-US" smtClean="0"/>
-              <a:t>1/24/23</a:t>
+              <a:t>8/23/24</a:t>
             </a:fld>
             <a:endParaRPr lang="en-US"/>
           </a:p>
@@ -2791,7 +2791,7 @@
           <a:p>
             <a:fld id="{E0434288-5E32-9949-BFBC-7031B3C73DE4}" type="datetimeFigureOut">
               <a:rPr lang="en-US" smtClean="0"/>
-              <a:t>1/24/23</a:t>
+              <a:t>8/23/24</a:t>
             </a:fld>
             <a:endParaRPr lang="en-US"/>
           </a:p>
@@ -3004,7 +3004,7 @@
           <a:p>
             <a:fld id="{E0434288-5E32-9949-BFBC-7031B3C73DE4}" type="datetimeFigureOut">
               <a:rPr lang="en-US" smtClean="0"/>
-              <a:t>1/24/23</a:t>
+              <a:t>8/23/24</a:t>
             </a:fld>
             <a:endParaRPr lang="en-US"/>
           </a:p>
@@ -3411,10 +3411,10 @@
       </p:grpSpPr>
       <p:pic>
         <p:nvPicPr>
-          <p:cNvPr id="5" name="Picture 4" descr="Graphical user interface, application&#10;&#10;Description automatically generated">
+          <p:cNvPr id="2" name="Picture 1">
             <a:extLst>
               <a:ext uri="{FF2B5EF4-FFF2-40B4-BE49-F238E27FC236}">
-                <a16:creationId xmlns:a16="http://schemas.microsoft.com/office/drawing/2014/main" id="{60904DA6-66D8-D738-6C76-960DAB8A2A1C}"/>
+                <a16:creationId xmlns:a16="http://schemas.microsoft.com/office/drawing/2014/main" id="{6E2B50BE-4F5C-29B2-5D99-C3580016F674}"/>
               </a:ext>
             </a:extLst>
           </p:cNvPr>
@@ -3431,8 +3431,8 @@
         </p:blipFill>
         <p:spPr>
           <a:xfrm>
-            <a:off x="51958" y="1265273"/>
-            <a:ext cx="4828332" cy="2815913"/>
+            <a:off x="0" y="1250447"/>
+            <a:ext cx="4828332" cy="2885178"/>
           </a:xfrm>
           <a:prstGeom prst="rect">
             <a:avLst/>
@@ -3451,10 +3451,10 @@
       </p:pic>
       <p:pic>
         <p:nvPicPr>
-          <p:cNvPr id="7" name="Picture 6" descr="Graphical user interface, application&#10;&#10;Description automatically generated">
+          <p:cNvPr id="3" name="Picture 2">
             <a:extLst>
               <a:ext uri="{FF2B5EF4-FFF2-40B4-BE49-F238E27FC236}">
-                <a16:creationId xmlns:a16="http://schemas.microsoft.com/office/drawing/2014/main" id="{423B0D55-D023-3222-9B57-916301F938DF}"/>
+                <a16:creationId xmlns:a16="http://schemas.microsoft.com/office/drawing/2014/main" id="{AE15277D-5679-D326-AA6E-1B67DE5ED214}"/>
               </a:ext>
             </a:extLst>
           </p:cNvPr>
@@ -3471,8 +3471,8 @@
         </p:blipFill>
         <p:spPr>
           <a:xfrm>
-            <a:off x="1002411" y="3299451"/>
-            <a:ext cx="4828332" cy="2799621"/>
+            <a:off x="1027257" y="3299452"/>
+            <a:ext cx="4803486" cy="2876934"/>
           </a:xfrm>
           <a:prstGeom prst="rect">
             <a:avLst/>
@@ -3491,10 +3491,10 @@
       </p:pic>
       <p:pic>
         <p:nvPicPr>
-          <p:cNvPr id="9" name="Picture 8" descr="Graphical user interface, application&#10;&#10;Description automatically generated">
+          <p:cNvPr id="4" name="Picture 3">
             <a:extLst>
               <a:ext uri="{FF2B5EF4-FFF2-40B4-BE49-F238E27FC236}">
-                <a16:creationId xmlns:a16="http://schemas.microsoft.com/office/drawing/2014/main" id="{69CAAEA4-CF4B-21F5-2B7D-4DEA1171D4E5}"/>
+                <a16:creationId xmlns:a16="http://schemas.microsoft.com/office/drawing/2014/main" id="{8AF477D8-3818-75C0-5F78-B8DA5BD2A0D4}"/>
               </a:ext>
             </a:extLst>
           </p:cNvPr>
@@ -3512,7 +3512,7 @@
         <p:spPr>
           <a:xfrm>
             <a:off x="1832371" y="5057262"/>
-            <a:ext cx="4828332" cy="2821464"/>
+            <a:ext cx="4704837" cy="2821464"/>
           </a:xfrm>
           <a:prstGeom prst="rect">
             <a:avLst/>

</xml_diff>